<commit_message>
ROPE PPT add android image
</commit_message>
<xml_diff>
--- a/ROPE/Teach_PPT/跳繩BLE_APP.pptx
+++ b/ROPE/Teach_PPT/跳繩BLE_APP.pptx
@@ -237,7 +237,7 @@
           <a:p>
             <a:fld id="{D1D5F52B-5898-4D99-9D93-3B3F0EEEA299}" type="datetimeFigureOut">
               <a:rPr lang="zh-TW" altLang="en-US" smtClean="0"/>
-              <a:t>2025/2/23</a:t>
+              <a:t>2025/2/24</a:t>
             </a:fld>
             <a:endParaRPr lang="zh-TW" altLang="en-US"/>
           </a:p>
@@ -402,7 +402,7 @@
           <a:p>
             <a:fld id="{7376939F-6AE1-4C41-B872-EC3EC5DB4615}" type="datetimeFigureOut">
               <a:rPr lang="zh-TW" altLang="en-US" smtClean="0"/>
-              <a:t>2025/2/23</a:t>
+              <a:t>2025/2/24</a:t>
             </a:fld>
             <a:endParaRPr lang="zh-TW" altLang="en-US"/>
           </a:p>
@@ -882,7 +882,7 @@
           <a:p>
             <a:fld id="{DF36859A-F475-4A57-A69F-E97F787B5D94}" type="datetimeFigureOut">
               <a:rPr lang="zh-TW" altLang="en-US" smtClean="0"/>
-              <a:t>2025/2/23</a:t>
+              <a:t>2025/2/24</a:t>
             </a:fld>
             <a:endParaRPr lang="zh-TW" altLang="en-US"/>
           </a:p>
@@ -1059,7 +1059,7 @@
           <a:p>
             <a:fld id="{DF36859A-F475-4A57-A69F-E97F787B5D94}" type="datetimeFigureOut">
               <a:rPr lang="zh-TW" altLang="en-US" smtClean="0"/>
-              <a:t>2025/2/23</a:t>
+              <a:t>2025/2/24</a:t>
             </a:fld>
             <a:endParaRPr lang="zh-TW" altLang="en-US"/>
           </a:p>
@@ -1237,7 +1237,7 @@
           <a:p>
             <a:fld id="{DF36859A-F475-4A57-A69F-E97F787B5D94}" type="datetimeFigureOut">
               <a:rPr lang="zh-TW" altLang="en-US" smtClean="0"/>
-              <a:t>2025/2/23</a:t>
+              <a:t>2025/2/24</a:t>
             </a:fld>
             <a:endParaRPr lang="zh-TW" altLang="en-US"/>
           </a:p>
@@ -1419,7 +1419,7 @@
           <a:p>
             <a:fld id="{DF36859A-F475-4A57-A69F-E97F787B5D94}" type="datetimeFigureOut">
               <a:rPr lang="zh-TW" altLang="en-US" smtClean="0"/>
-              <a:t>2025/2/23</a:t>
+              <a:t>2025/2/24</a:t>
             </a:fld>
             <a:endParaRPr lang="zh-TW" altLang="en-US"/>
           </a:p>
@@ -1717,7 +1717,7 @@
           <a:p>
             <a:fld id="{DF36859A-F475-4A57-A69F-E97F787B5D94}" type="datetimeFigureOut">
               <a:rPr lang="zh-TW" altLang="en-US" smtClean="0"/>
-              <a:t>2025/2/23</a:t>
+              <a:t>2025/2/24</a:t>
             </a:fld>
             <a:endParaRPr lang="zh-TW" altLang="en-US"/>
           </a:p>
@@ -1950,7 +1950,7 @@
           <a:p>
             <a:fld id="{DF36859A-F475-4A57-A69F-E97F787B5D94}" type="datetimeFigureOut">
               <a:rPr lang="zh-TW" altLang="en-US" smtClean="0"/>
-              <a:t>2025/2/23</a:t>
+              <a:t>2025/2/24</a:t>
             </a:fld>
             <a:endParaRPr lang="zh-TW" altLang="en-US"/>
           </a:p>
@@ -2318,7 +2318,7 @@
           <a:p>
             <a:fld id="{DF36859A-F475-4A57-A69F-E97F787B5D94}" type="datetimeFigureOut">
               <a:rPr lang="zh-TW" altLang="en-US" smtClean="0"/>
-              <a:t>2025/2/23</a:t>
+              <a:t>2025/2/24</a:t>
             </a:fld>
             <a:endParaRPr lang="zh-TW" altLang="en-US"/>
           </a:p>
@@ -2439,7 +2439,7 @@
           <a:p>
             <a:fld id="{DF36859A-F475-4A57-A69F-E97F787B5D94}" type="datetimeFigureOut">
               <a:rPr lang="zh-TW" altLang="en-US" smtClean="0"/>
-              <a:t>2025/2/23</a:t>
+              <a:t>2025/2/24</a:t>
             </a:fld>
             <a:endParaRPr lang="zh-TW" altLang="en-US"/>
           </a:p>
@@ -2534,7 +2534,7 @@
           <a:p>
             <a:fld id="{DF36859A-F475-4A57-A69F-E97F787B5D94}" type="datetimeFigureOut">
               <a:rPr lang="zh-TW" altLang="en-US" smtClean="0"/>
-              <a:t>2025/2/23</a:t>
+              <a:t>2025/2/24</a:t>
             </a:fld>
             <a:endParaRPr lang="zh-TW" altLang="en-US"/>
           </a:p>
@@ -2809,7 +2809,7 @@
           <a:p>
             <a:fld id="{DF36859A-F475-4A57-A69F-E97F787B5D94}" type="datetimeFigureOut">
               <a:rPr lang="zh-TW" altLang="en-US" smtClean="0"/>
-              <a:t>2025/2/23</a:t>
+              <a:t>2025/2/24</a:t>
             </a:fld>
             <a:endParaRPr lang="zh-TW" altLang="en-US"/>
           </a:p>
@@ -3061,7 +3061,7 @@
           <a:p>
             <a:fld id="{DF36859A-F475-4A57-A69F-E97F787B5D94}" type="datetimeFigureOut">
               <a:rPr lang="zh-TW" altLang="en-US" smtClean="0"/>
-              <a:t>2025/2/23</a:t>
+              <a:t>2025/2/24</a:t>
             </a:fld>
             <a:endParaRPr lang="zh-TW" altLang="en-US"/>
           </a:p>
@@ -3272,7 +3272,7 @@
           <a:p>
             <a:fld id="{DF36859A-F475-4A57-A69F-E97F787B5D94}" type="datetimeFigureOut">
               <a:rPr lang="zh-TW" altLang="en-US" smtClean="0"/>
-              <a:t>2025/2/23</a:t>
+              <a:t>2025/2/24</a:t>
             </a:fld>
             <a:endParaRPr lang="zh-TW" altLang="en-US"/>
           </a:p>
@@ -3904,7 +3904,6 @@
               <a:rPr lang="zh-TW" altLang="en-US" sz="5400" dirty="0"/>
               <a:t>跳繩</a:t>
             </a:r>
-            <a:endParaRPr lang="zh-TW" altLang="en-US" sz="5400" dirty="0"/>
           </a:p>
         </p:txBody>
       </p:sp>
@@ -5759,6 +5758,35 @@
           </a:prstGeom>
         </p:spPr>
       </p:pic>
+      <p:pic>
+        <p:nvPicPr>
+          <p:cNvPr id="3" name="圖片 2"/>
+          <p:cNvPicPr>
+            <a:picLocks noChangeAspect="1"/>
+          </p:cNvPicPr>
+          <p:nvPr/>
+        </p:nvPicPr>
+        <p:blipFill rotWithShape="1">
+          <a:blip r:embed="rId3" cstate="print">
+            <a:extLst>
+              <a:ext uri="{28A0092B-C50C-407E-A947-70E740481C1C}">
+                <a14:useLocalDpi xmlns:a14="http://schemas.microsoft.com/office/drawing/2010/main" val="0"/>
+              </a:ext>
+            </a:extLst>
+          </a:blip>
+          <a:srcRect l="-1596" r="-1" b="48144"/>
+          <a:stretch/>
+        </p:blipFill>
+        <p:spPr>
+          <a:xfrm>
+            <a:off x="6511005" y="955696"/>
+            <a:ext cx="4426132" cy="5020351"/>
+          </a:xfrm>
+          <a:prstGeom prst="rect">
+            <a:avLst/>
+          </a:prstGeom>
+        </p:spPr>
+      </p:pic>
     </p:spTree>
     <p:extLst>
       <p:ext uri="{BB962C8B-B14F-4D97-AF65-F5344CB8AC3E}">
@@ -5808,25 +5836,35 @@
           </a:p>
         </p:txBody>
       </p:sp>
-      <p:sp>
-        <p:nvSpPr>
-          <p:cNvPr id="3" name="內容版面配置區 2"/>
-          <p:cNvSpPr>
-            <a:spLocks noGrp="1"/>
-          </p:cNvSpPr>
+      <p:pic>
+        <p:nvPicPr>
+          <p:cNvPr id="4" name="內容版面配置區 3"/>
+          <p:cNvPicPr>
+            <a:picLocks noGrp="1" noChangeAspect="1"/>
+          </p:cNvPicPr>
           <p:nvPr>
             <p:ph idx="1"/>
           </p:nvPr>
-        </p:nvSpPr>
-        <p:spPr/>
-        <p:txBody>
-          <a:bodyPr/>
-          <a:lstStyle/>
-          <a:p>
-            <a:endParaRPr lang="zh-TW" altLang="en-US"/>
-          </a:p>
-        </p:txBody>
-      </p:sp>
+        </p:nvPicPr>
+        <p:blipFill>
+          <a:blip r:embed="rId2" cstate="print">
+            <a:extLst>
+              <a:ext uri="{28A0092B-C50C-407E-A947-70E740481C1C}">
+                <a14:useLocalDpi xmlns:a14="http://schemas.microsoft.com/office/drawing/2010/main" val="0"/>
+              </a:ext>
+            </a:extLst>
+          </a:blip>
+          <a:stretch>
+            <a:fillRect/>
+          </a:stretch>
+        </p:blipFill>
+        <p:spPr>
+          <a:xfrm>
+            <a:off x="3123601" y="87108"/>
+            <a:ext cx="5282979" cy="6662424"/>
+          </a:xfrm>
+        </p:spPr>
+      </p:pic>
     </p:spTree>
     <p:extLst>
       <p:ext uri="{BB962C8B-B14F-4D97-AF65-F5344CB8AC3E}">

</xml_diff>